<commit_message>
added distribution for sampling, updated powerpoint slide
</commit_message>
<xml_diff>
--- a/Task 3.pptx
+++ b/Task 3.pptx
@@ -8,7 +8,7 @@
     <p:sldId id="256" r:id="rId2"/>
     <p:sldId id="260" r:id="rId3"/>
     <p:sldId id="261" r:id="rId4"/>
-    <p:sldId id="262" r:id="rId5"/>
+    <p:sldId id="270" r:id="rId5"/>
     <p:sldId id="269" r:id="rId6"/>
     <p:sldId id="259" r:id="rId7"/>
     <p:sldId id="263" r:id="rId8"/>
@@ -312,6 +312,37 @@
       </pc:sldChg>
     </pc:docChg>
   </pc:docChgLst>
+  <pc:docChgLst>
+    <pc:chgData name="Sandro Assek" userId="c00f4fa3-2fb0-4ff2-817b-9b12cde38168" providerId="ADAL" clId="{3E78E571-0358-4538-810C-9FCD0236EE78}"/>
+    <pc:docChg chg="addSld delSld modSld">
+      <pc:chgData name="Sandro Assek" userId="c00f4fa3-2fb0-4ff2-817b-9b12cde38168" providerId="ADAL" clId="{3E78E571-0358-4538-810C-9FCD0236EE78}" dt="2023-05-17T13:15:22.190" v="10" actId="20577"/>
+      <pc:docMkLst>
+        <pc:docMk/>
+      </pc:docMkLst>
+      <pc:sldChg chg="del">
+        <pc:chgData name="Sandro Assek" userId="c00f4fa3-2fb0-4ff2-817b-9b12cde38168" providerId="ADAL" clId="{3E78E571-0358-4538-810C-9FCD0236EE78}" dt="2023-05-17T13:15:07.198" v="1" actId="2696"/>
+        <pc:sldMkLst>
+          <pc:docMk/>
+          <pc:sldMk cId="3106440683" sldId="262"/>
+        </pc:sldMkLst>
+      </pc:sldChg>
+      <pc:sldChg chg="modSp add">
+        <pc:chgData name="Sandro Assek" userId="c00f4fa3-2fb0-4ff2-817b-9b12cde38168" providerId="ADAL" clId="{3E78E571-0358-4538-810C-9FCD0236EE78}" dt="2023-05-17T13:15:22.190" v="10" actId="20577"/>
+        <pc:sldMkLst>
+          <pc:docMk/>
+          <pc:sldMk cId="963190870" sldId="270"/>
+        </pc:sldMkLst>
+        <pc:spChg chg="mod">
+          <ac:chgData name="Sandro Assek" userId="c00f4fa3-2fb0-4ff2-817b-9b12cde38168" providerId="ADAL" clId="{3E78E571-0358-4538-810C-9FCD0236EE78}" dt="2023-05-17T13:15:22.190" v="10" actId="20577"/>
+          <ac:spMkLst>
+            <pc:docMk/>
+            <pc:sldMk cId="963190870" sldId="270"/>
+            <ac:spMk id="3" creationId="{382485F1-5F03-249C-BBE8-A0F172E3574A}"/>
+          </ac:spMkLst>
+        </pc:spChg>
+      </pc:sldChg>
+    </pc:docChg>
+  </pc:docChgLst>
 </pc:chgInfo>
 </file>
 
@@ -516,7 +547,7 @@
           <a:p>
             <a:fld id="{5FE1CFB4-4EC3-4B46-8D35-E8CFDF4A4890}" type="slidenum">
               <a:rPr lang="de-DE" smtClean="0"/>
-              <a:t>‹#›</a:t>
+              <a:t>‹Nr.›</a:t>
             </a:fld>
             <a:endParaRPr lang="de-DE"/>
           </a:p>
@@ -714,7 +745,7 @@
           <a:p>
             <a:fld id="{5FE1CFB4-4EC3-4B46-8D35-E8CFDF4A4890}" type="slidenum">
               <a:rPr lang="de-DE" smtClean="0"/>
-              <a:t>‹#›</a:t>
+              <a:t>‹Nr.›</a:t>
             </a:fld>
             <a:endParaRPr lang="de-DE"/>
           </a:p>
@@ -922,7 +953,7 @@
           <a:p>
             <a:fld id="{5FE1CFB4-4EC3-4B46-8D35-E8CFDF4A4890}" type="slidenum">
               <a:rPr lang="de-DE" smtClean="0"/>
-              <a:t>‹#›</a:t>
+              <a:t>‹Nr.›</a:t>
             </a:fld>
             <a:endParaRPr lang="de-DE"/>
           </a:p>
@@ -1120,7 +1151,7 @@
           <a:p>
             <a:fld id="{5FE1CFB4-4EC3-4B46-8D35-E8CFDF4A4890}" type="slidenum">
               <a:rPr lang="de-DE" smtClean="0"/>
-              <a:t>‹#›</a:t>
+              <a:t>‹Nr.›</a:t>
             </a:fld>
             <a:endParaRPr lang="de-DE"/>
           </a:p>
@@ -1395,7 +1426,7 @@
           <a:p>
             <a:fld id="{5FE1CFB4-4EC3-4B46-8D35-E8CFDF4A4890}" type="slidenum">
               <a:rPr lang="de-DE" smtClean="0"/>
-              <a:t>‹#›</a:t>
+              <a:t>‹Nr.›</a:t>
             </a:fld>
             <a:endParaRPr lang="de-DE"/>
           </a:p>
@@ -1660,7 +1691,7 @@
           <a:p>
             <a:fld id="{5FE1CFB4-4EC3-4B46-8D35-E8CFDF4A4890}" type="slidenum">
               <a:rPr lang="de-DE" smtClean="0"/>
-              <a:t>‹#›</a:t>
+              <a:t>‹Nr.›</a:t>
             </a:fld>
             <a:endParaRPr lang="de-DE"/>
           </a:p>
@@ -2072,7 +2103,7 @@
           <a:p>
             <a:fld id="{5FE1CFB4-4EC3-4B46-8D35-E8CFDF4A4890}" type="slidenum">
               <a:rPr lang="de-DE" smtClean="0"/>
-              <a:t>‹#›</a:t>
+              <a:t>‹Nr.›</a:t>
             </a:fld>
             <a:endParaRPr lang="de-DE"/>
           </a:p>
@@ -2213,7 +2244,7 @@
           <a:p>
             <a:fld id="{5FE1CFB4-4EC3-4B46-8D35-E8CFDF4A4890}" type="slidenum">
               <a:rPr lang="de-DE" smtClean="0"/>
-              <a:t>‹#›</a:t>
+              <a:t>‹Nr.›</a:t>
             </a:fld>
             <a:endParaRPr lang="de-DE"/>
           </a:p>
@@ -2326,7 +2357,7 @@
           <a:p>
             <a:fld id="{5FE1CFB4-4EC3-4B46-8D35-E8CFDF4A4890}" type="slidenum">
               <a:rPr lang="de-DE" smtClean="0"/>
-              <a:t>‹#›</a:t>
+              <a:t>‹Nr.›</a:t>
             </a:fld>
             <a:endParaRPr lang="de-DE"/>
           </a:p>
@@ -2637,7 +2668,7 @@
           <a:p>
             <a:fld id="{5FE1CFB4-4EC3-4B46-8D35-E8CFDF4A4890}" type="slidenum">
               <a:rPr lang="de-DE" smtClean="0"/>
-              <a:t>‹#›</a:t>
+              <a:t>‹Nr.›</a:t>
             </a:fld>
             <a:endParaRPr lang="de-DE"/>
           </a:p>
@@ -2925,7 +2956,7 @@
           <a:p>
             <a:fld id="{5FE1CFB4-4EC3-4B46-8D35-E8CFDF4A4890}" type="slidenum">
               <a:rPr lang="de-DE" smtClean="0"/>
-              <a:t>‹#›</a:t>
+              <a:t>‹Nr.›</a:t>
             </a:fld>
             <a:endParaRPr lang="de-DE"/>
           </a:p>
@@ -3202,7 +3233,7 @@
           <a:p>
             <a:fld id="{5FE1CFB4-4EC3-4B46-8D35-E8CFDF4A4890}" type="slidenum">
               <a:rPr lang="de-DE" smtClean="0"/>
-              <a:t>‹#›</a:t>
+              <a:t>‹Nr.›</a:t>
             </a:fld>
             <a:endParaRPr lang="de-DE"/>
           </a:p>
@@ -5026,25 +5057,66 @@
         </p:spPr>
         <p:txBody>
           <a:bodyPr>
-            <a:normAutofit/>
+            <a:normAutofit lnSpcReduction="10000"/>
           </a:bodyPr>
           <a:lstStyle/>
           <a:p>
             <a:r>
               <a:rPr lang="en-GB" sz="2000" dirty="0"/>
-              <a:t>To exclude some uncertainty of the labelling process we dropped fragments where less than 71% of the annotators agreed with the overall vote </a:t>
+              <a:t>To exclude some uncertainty in the labelling process we dropped fragments where less than a specific distribution of the annotators agreed with the overall vote.</a:t>
             </a:r>
           </a:p>
           <a:p>
             <a:r>
               <a:rPr lang="en-GB" sz="2000" dirty="0"/>
-              <a:t>For training a classifier to actually perform classification on new data it would probably make sense to include also labels where annotators disagreed even more, but as this task was more focused on trying different classifiers and getting a feeling for their different performances we decided to exclude these sample for now</a:t>
+              <a:t>Samples have at least 3 and at most 7 different annotators. Therefore, we accept samples according to the following majority distribution:</a:t>
+            </a:r>
+          </a:p>
+          <a:p>
+            <a:pPr lvl="1"/>
+            <a:r>
+              <a:rPr lang="en-GB" sz="1600" dirty="0"/>
+              <a:t>3 annotations: accept 3/3 equivalent annotations</a:t>
+            </a:r>
+          </a:p>
+          <a:p>
+            <a:pPr lvl="1"/>
+            <a:r>
+              <a:rPr lang="en-GB" sz="1600" dirty="0"/>
+              <a:t>4 annotations: accept majority 3/4 equivalent annotations</a:t>
+            </a:r>
+          </a:p>
+          <a:p>
+            <a:pPr lvl="1"/>
+            <a:r>
+              <a:rPr lang="en-GB" sz="1600" dirty="0"/>
+              <a:t>5 annotations: accept majority 3/5 equivalent annotations</a:t>
+            </a:r>
+          </a:p>
+          <a:p>
+            <a:pPr lvl="1"/>
+            <a:r>
+              <a:rPr lang="en-GB" sz="1600" dirty="0"/>
+              <a:t>6 annotations: accept majority 4/6 equivalent annotations</a:t>
+            </a:r>
+          </a:p>
+          <a:p>
+            <a:pPr lvl="1"/>
+            <a:r>
+              <a:rPr lang="en-GB" sz="1600" dirty="0"/>
+              <a:t>7 annotations: accept majority 5/7 equivalent annotations</a:t>
             </a:r>
           </a:p>
           <a:p>
             <a:r>
               <a:rPr lang="en-GB" sz="2000" dirty="0"/>
-              <a:t>Excluding the described samples from the 120.000 we ended up with 96.656, which is still enough for training and testing</a:t>
+              <a:t>For training a classifier to actually perform classification on new data it would probably make sense to include also labels where annotators disagreed even more, but as this task was more focused on trying different classifiers and getting a feeling for their different performances we decided to stick to the distribution from above for now on.</a:t>
+            </a:r>
+          </a:p>
+          <a:p>
+            <a:r>
+              <a:rPr lang="en-GB" sz="2000" dirty="0"/>
+              <a:t>Excluding the described samples from above we reduced our initial 120.000 samples to 96.748, which is still enough for training and testing on our models.</a:t>
             </a:r>
           </a:p>
         </p:txBody>
@@ -5052,7 +5124,7 @@
     </p:spTree>
     <p:extLst>
       <p:ext uri="{BB962C8B-B14F-4D97-AF65-F5344CB8AC3E}">
-        <p14:creationId xmlns:p14="http://schemas.microsoft.com/office/powerpoint/2010/main" val="3106440683"/>
+        <p14:creationId xmlns:p14="http://schemas.microsoft.com/office/powerpoint/2010/main" val="963190870"/>
       </p:ext>
     </p:extLst>
   </p:cSld>

</xml_diff>